<commit_message>
mise à jour de la date de soutenance
</commit_message>
<xml_diff>
--- a/doc/Soutenance Projet 10.pptx
+++ b/doc/Soutenance Projet 10.pptx
@@ -3189,11 +3189,7 @@
           <a:p>
             <a:r>
               <a:rPr lang="fr-FR" dirty="0" smtClean="0"/>
-              <a:t>Soutenance Projet </a:t>
-            </a:r>
-            <a:r>
-              <a:rPr lang="fr-FR" dirty="0" smtClean="0"/>
-              <a:t>10</a:t>
+              <a:t>Soutenance Projet 10</a:t>
             </a:r>
             <a:endParaRPr lang="fr-FR" dirty="0"/>
           </a:p>
@@ -3232,8 +3228,12 @@
           </a:p>
           <a:p>
             <a:r>
-              <a:rPr lang="fr-FR" sz="2400" dirty="0" smtClean="0"/>
-              <a:t>x/05/2019</a:t>
+              <a:rPr lang="fr-FR" sz="2400" dirty="0"/>
+              <a:t>4</a:t>
+            </a:r>
+            <a:r>
+              <a:rPr lang="fr-FR" sz="2400" smtClean="0"/>
+              <a:t>/05/2019</a:t>
             </a:r>
             <a:endParaRPr lang="fr-FR" sz="2400" dirty="0"/>
           </a:p>
@@ -3313,14 +3313,12 @@
               <a:rPr lang="fr-FR" dirty="0" smtClean="0"/>
               <a:t>Décomposition du settings.py</a:t>
             </a:r>
-            <a:endParaRPr lang="fr-FR" dirty="0" smtClean="0"/>
           </a:p>
           <a:p>
             <a:r>
               <a:rPr lang="fr-FR" dirty="0" smtClean="0"/>
               <a:t>Le Déploiement</a:t>
             </a:r>
-            <a:endParaRPr lang="fr-FR" dirty="0" smtClean="0"/>
           </a:p>
           <a:p>
             <a:r>

</xml_diff>